<commit_message>
oublie pas la socket image
</commit_message>
<xml_diff>
--- a/Research on the topic/Architecture & Regulations (Vincent&Bruno)/Presentation 13 04 first draft.pptx
+++ b/Research on the topic/Architecture & Regulations (Vincent&Bruno)/Presentation 13 04 first draft.pptx
@@ -6,10 +6,9 @@
   </p:sldMasterIdLst>
   <p:sldIdLst>
     <p:sldId id="256" r:id="rId2"/>
-    <p:sldId id="257" r:id="rId3"/>
-    <p:sldId id="258" r:id="rId4"/>
-    <p:sldId id="259" r:id="rId5"/>
-    <p:sldId id="260" r:id="rId6"/>
+    <p:sldId id="258" r:id="rId3"/>
+    <p:sldId id="259" r:id="rId4"/>
+    <p:sldId id="260" r:id="rId5"/>
   </p:sldIdLst>
   <p:sldSz cx="12192000" cy="6858000"/>
   <p:notesSz cx="6858000" cy="9144000"/>
@@ -3016,6 +3015,13 @@
   <p:clrMapOvr>
     <a:masterClrMapping/>
   </p:clrMapOvr>
+  <p:timing>
+    <p:tnLst>
+      <p:par>
+        <p:cTn id="1" dur="indefinite" restart="never" nodeType="tmRoot"/>
+      </p:par>
+    </p:tnLst>
+  </p:timing>
 </p:sld>
 </file>
 
@@ -3048,81 +3054,6 @@
         </p:nvSpPr>
         <p:spPr/>
         <p:txBody>
-          <a:bodyPr/>
-          <a:lstStyle/>
-          <a:p>
-            <a:endParaRPr lang="fr-FR"/>
-          </a:p>
-        </p:txBody>
-      </p:sp>
-      <p:sp>
-        <p:nvSpPr>
-          <p:cNvPr id="3" name="Espace réservé du contenu 2"/>
-          <p:cNvSpPr>
-            <a:spLocks noGrp="1"/>
-          </p:cNvSpPr>
-          <p:nvPr>
-            <p:ph idx="1"/>
-          </p:nvPr>
-        </p:nvSpPr>
-        <p:spPr/>
-        <p:txBody>
-          <a:bodyPr/>
-          <a:lstStyle/>
-          <a:p>
-            <a:endParaRPr lang="fr-FR" dirty="0"/>
-          </a:p>
-        </p:txBody>
-      </p:sp>
-    </p:spTree>
-    <p:extLst>
-      <p:ext uri="{BB962C8B-B14F-4D97-AF65-F5344CB8AC3E}">
-        <p14:creationId xmlns:p14="http://schemas.microsoft.com/office/powerpoint/2010/main" val="2335858207"/>
-      </p:ext>
-    </p:extLst>
-  </p:cSld>
-  <p:clrMapOvr>
-    <a:masterClrMapping/>
-  </p:clrMapOvr>
-  <p:timing>
-    <p:tnLst>
-      <p:par>
-        <p:cTn id="1" dur="indefinite" restart="never" nodeType="tmRoot"/>
-      </p:par>
-    </p:tnLst>
-  </p:timing>
-</p:sld>
-</file>
-
-<file path=ppt/slides/slide3.xml><?xml version="1.0" encoding="utf-8"?>
-<p:sld xmlns:a="http://schemas.openxmlformats.org/drawingml/2006/main" xmlns:r="http://schemas.openxmlformats.org/officeDocument/2006/relationships" xmlns:p="http://schemas.openxmlformats.org/presentationml/2006/main">
-  <p:cSld>
-    <p:spTree>
-      <p:nvGrpSpPr>
-        <p:cNvPr id="1" name=""/>
-        <p:cNvGrpSpPr/>
-        <p:nvPr/>
-      </p:nvGrpSpPr>
-      <p:grpSpPr>
-        <a:xfrm>
-          <a:off x="0" y="0"/>
-          <a:ext cx="0" cy="0"/>
-          <a:chOff x="0" y="0"/>
-          <a:chExt cx="0" cy="0"/>
-        </a:xfrm>
-      </p:grpSpPr>
-      <p:sp>
-        <p:nvSpPr>
-          <p:cNvPr id="2" name="Titre 1"/>
-          <p:cNvSpPr>
-            <a:spLocks noGrp="1"/>
-          </p:cNvSpPr>
-          <p:nvPr>
-            <p:ph type="title"/>
-          </p:nvPr>
-        </p:nvSpPr>
-        <p:spPr/>
-        <p:txBody>
           <a:bodyPr>
             <a:normAutofit fontScale="90000"/>
           </a:bodyPr>
@@ -3132,10 +3063,6 @@
               <a:rPr lang="fr-FR" dirty="0" smtClean="0"/>
               <a:t>Architecture and zoning</a:t>
             </a:r>
-            <a:r>
-              <a:rPr lang="fr-FR" dirty="0" smtClean="0"/>
-              <a:t/>
-            </a:r>
             <a:br>
               <a:rPr lang="fr-FR" dirty="0" smtClean="0"/>
             </a:br>
@@ -3150,10 +3077,6 @@
             <a:r>
               <a:rPr lang="fr-FR" dirty="0" smtClean="0"/>
               <a:t> issues</a:t>
-            </a:r>
-            <a:r>
-              <a:rPr lang="fr-FR" dirty="0" smtClean="0"/>
-              <a:t/>
             </a:r>
             <a:br>
               <a:rPr lang="fr-FR" dirty="0" smtClean="0"/>
@@ -3320,7 +3243,6 @@
               <a:rPr lang="fr-FR" dirty="0" smtClean="0"/>
               <a:t> ?</a:t>
             </a:r>
-            <a:endParaRPr lang="fr-FR" dirty="0" smtClean="0"/>
           </a:p>
           <a:p>
             <a:endParaRPr lang="fr-FR" dirty="0"/>
@@ -3449,7 +3371,7 @@
 </p:sld>
 </file>
 
-<file path=ppt/slides/slide4.xml><?xml version="1.0" encoding="utf-8"?>
+<file path=ppt/slides/slide3.xml><?xml version="1.0" encoding="utf-8"?>
 <p:sld xmlns:a="http://schemas.openxmlformats.org/drawingml/2006/main" xmlns:r="http://schemas.openxmlformats.org/officeDocument/2006/relationships" xmlns:p="http://schemas.openxmlformats.org/presentationml/2006/main">
   <p:cSld>
     <p:spTree>
@@ -3696,7 +3618,7 @@
 </p:sld>
 </file>
 
-<file path=ppt/slides/slide5.xml><?xml version="1.0" encoding="utf-8"?>
+<file path=ppt/slides/slide4.xml><?xml version="1.0" encoding="utf-8"?>
 <p:sld xmlns:a="http://schemas.openxmlformats.org/drawingml/2006/main" xmlns:r="http://schemas.openxmlformats.org/officeDocument/2006/relationships" xmlns:p="http://schemas.openxmlformats.org/presentationml/2006/main">
   <p:cSld>
     <p:spTree>
@@ -3748,187 +3670,308 @@
         </p:nvSpPr>
         <p:spPr/>
         <p:txBody>
-          <a:bodyPr/>
+          <a:bodyPr>
+            <a:normAutofit fontScale="92500" lnSpcReduction="10000"/>
+          </a:bodyPr>
           <a:lstStyle/>
           <a:p>
             <a:pPr marL="0" indent="0">
               <a:buNone/>
             </a:pPr>
             <a:r>
-              <a:rPr lang="fr-FR" dirty="0" err="1" smtClean="0"/>
+              <a:rPr lang="fr-FR" sz="2400" u="sng" dirty="0" err="1" smtClean="0"/>
               <a:t>Creation</a:t>
             </a:r>
             <a:r>
-              <a:rPr lang="fr-FR" dirty="0" smtClean="0"/>
+              <a:rPr lang="fr-FR" sz="2400" u="sng" dirty="0" smtClean="0"/>
+              <a:t> of new </a:t>
+            </a:r>
+            <a:r>
+              <a:rPr lang="fr-FR" sz="2400" u="sng" dirty="0" err="1" smtClean="0"/>
+              <a:t>rules</a:t>
+            </a:r>
+            <a:r>
+              <a:rPr lang="fr-FR" sz="2400" u="sng" dirty="0" smtClean="0"/>
+              <a:t> and standards:</a:t>
+            </a:r>
+            <a:endParaRPr lang="fr-FR" sz="2400" u="sng" dirty="0" smtClean="0"/>
+          </a:p>
+          <a:p>
+            <a:pPr marL="0" indent="0">
+              <a:buNone/>
+            </a:pPr>
+            <a:r>
+              <a:rPr lang="fr-FR" sz="2400" dirty="0" smtClean="0">
+                <a:sym typeface="Wingdings" panose="05000000000000000000" pitchFamily="2" charset="2"/>
+              </a:rPr>
+              <a:t></a:t>
+            </a:r>
+            <a:r>
+              <a:rPr lang="en-US" sz="2400" dirty="0" smtClean="0"/>
+              <a:t>Companies</a:t>
+            </a:r>
+            <a:r>
+              <a:rPr lang="fr-FR" sz="2400" dirty="0" smtClean="0"/>
+              <a:t> </a:t>
+            </a:r>
+            <a:r>
+              <a:rPr lang="fr-FR" sz="2400" dirty="0" smtClean="0"/>
+              <a:t>(</a:t>
+            </a:r>
+            <a:r>
+              <a:rPr lang="fr-FR" sz="2400" dirty="0" err="1" smtClean="0"/>
+              <a:t>ChargePoint</a:t>
+            </a:r>
+            <a:r>
+              <a:rPr lang="fr-FR" sz="2400" dirty="0" smtClean="0"/>
+              <a:t>, </a:t>
+            </a:r>
+            <a:r>
+              <a:rPr lang="fr-FR" sz="2400" dirty="0" err="1" smtClean="0"/>
+              <a:t>CHAdeMO</a:t>
+            </a:r>
+            <a:r>
+              <a:rPr lang="fr-FR" sz="2400" dirty="0" smtClean="0"/>
+              <a:t>) </a:t>
+            </a:r>
+            <a:endParaRPr lang="fr-FR" sz="2400" dirty="0" smtClean="0"/>
+          </a:p>
+          <a:p>
+            <a:pPr marL="0" indent="0">
+              <a:buNone/>
+            </a:pPr>
+            <a:r>
+              <a:rPr lang="fr-FR" sz="2400" dirty="0" smtClean="0">
+                <a:sym typeface="Wingdings" panose="05000000000000000000" pitchFamily="2" charset="2"/>
+              </a:rPr>
+              <a:t></a:t>
+            </a:r>
+            <a:r>
+              <a:rPr lang="fr-FR" sz="2400" dirty="0" err="1" smtClean="0"/>
+              <a:t>E.g</a:t>
+            </a:r>
+            <a:r>
+              <a:rPr lang="fr-FR" sz="2400" dirty="0" smtClean="0"/>
+              <a:t>. Plug in system, standardisation of the </a:t>
+            </a:r>
+            <a:r>
+              <a:rPr lang="en-US" sz="2400" dirty="0" smtClean="0"/>
+              <a:t>models to ONE model</a:t>
+            </a:r>
+          </a:p>
+          <a:p>
+            <a:pPr marL="0" indent="0">
+              <a:buNone/>
+            </a:pPr>
+            <a:r>
+              <a:rPr lang="fr-FR" sz="2400" b="1" u="sng" dirty="0" err="1" smtClean="0"/>
+              <a:t>Overview</a:t>
+            </a:r>
+            <a:r>
+              <a:rPr lang="fr-FR" sz="2400" dirty="0" smtClean="0"/>
+              <a:t>: </a:t>
+            </a:r>
+            <a:r>
+              <a:rPr lang="en-US" sz="2400" dirty="0"/>
+              <a:t>Specific </a:t>
+            </a:r>
+            <a:r>
+              <a:rPr lang="en-US" sz="2400" dirty="0" smtClean="0"/>
+              <a:t>inlet/connector/plug/socket-outlet </a:t>
+            </a:r>
+            <a:r>
+              <a:rPr lang="en-US" sz="2400" dirty="0"/>
+              <a:t>requirements, General system requirement and interface, Charging </a:t>
+            </a:r>
+            <a:r>
+              <a:rPr lang="en-US" sz="2400" dirty="0" smtClean="0"/>
+              <a:t>levels/Modes, </a:t>
+            </a:r>
+            <a:r>
+              <a:rPr lang="en-US" sz="2400" dirty="0"/>
+              <a:t>Design </a:t>
+            </a:r>
+            <a:r>
+              <a:rPr lang="en-US" sz="2400"/>
+              <a:t>standards </a:t>
+            </a:r>
+            <a:r>
+              <a:rPr lang="en-US" sz="2400" smtClean="0"/>
+              <a:t>…</a:t>
+            </a:r>
+          </a:p>
+          <a:p>
+            <a:pPr marL="0" indent="0">
+              <a:buNone/>
+            </a:pPr>
+            <a:endParaRPr lang="fr-FR" sz="2400" dirty="0"/>
+          </a:p>
+          <a:p>
+            <a:pPr marL="0" indent="0">
+              <a:buNone/>
+            </a:pPr>
+            <a:r>
+              <a:rPr lang="fr-FR" sz="2400" u="sng" dirty="0" smtClean="0"/>
+              <a:t>Adaptations of </a:t>
+            </a:r>
+            <a:r>
+              <a:rPr lang="fr-FR" sz="2400" u="sng" dirty="0" err="1" smtClean="0"/>
+              <a:t>existing</a:t>
+            </a:r>
+            <a:r>
+              <a:rPr lang="fr-FR" sz="2400" u="sng" dirty="0" smtClean="0"/>
+              <a:t> </a:t>
+            </a:r>
+            <a:r>
+              <a:rPr lang="fr-FR" sz="2400" u="sng" dirty="0" err="1" smtClean="0"/>
+              <a:t>rules</a:t>
+            </a:r>
+            <a:r>
+              <a:rPr lang="fr-FR" sz="2400" u="sng" dirty="0" smtClean="0"/>
+              <a:t> and </a:t>
+            </a:r>
+            <a:r>
+              <a:rPr lang="fr-FR" sz="2400" u="sng" dirty="0" err="1" smtClean="0"/>
+              <a:t>laws</a:t>
+            </a:r>
+            <a:r>
+              <a:rPr lang="fr-FR" sz="2400" u="sng" dirty="0" smtClean="0"/>
               <a:t>:</a:t>
             </a:r>
-          </a:p>
-          <a:p>
-            <a:pPr marL="0" indent="0">
+            <a:endParaRPr lang="fr-FR" sz="2400" u="sng" dirty="0" smtClean="0"/>
+          </a:p>
+          <a:p>
+            <a:pPr marL="0" lvl="0" indent="0">
               <a:buNone/>
             </a:pPr>
             <a:r>
-              <a:rPr lang="fr-FR" dirty="0" err="1" smtClean="0"/>
-              <a:t>Companies</a:t>
-            </a:r>
-            <a:r>
-              <a:rPr lang="fr-FR" dirty="0" smtClean="0"/>
+              <a:rPr lang="fr-FR" sz="2400" dirty="0" smtClean="0">
+                <a:sym typeface="Wingdings" panose="05000000000000000000" pitchFamily="2" charset="2"/>
+              </a:rPr>
+              <a:t></a:t>
+            </a:r>
+            <a:r>
+              <a:rPr lang="en-US" sz="2400" dirty="0" smtClean="0"/>
+              <a:t>Governments</a:t>
+            </a:r>
+            <a:r>
+              <a:rPr lang="fr-FR" sz="2400" dirty="0" smtClean="0"/>
+              <a:t> </a:t>
+            </a:r>
+            <a:r>
+              <a:rPr lang="fr-FR" sz="2400" dirty="0" smtClean="0"/>
+              <a:t>and </a:t>
+            </a:r>
+            <a:r>
+              <a:rPr lang="fr-FR" sz="2400" dirty="0" err="1" smtClean="0"/>
+              <a:t>organizations</a:t>
+            </a:r>
+            <a:r>
+              <a:rPr lang="fr-FR" sz="2400" dirty="0" smtClean="0"/>
               <a:t> (</a:t>
             </a:r>
             <a:r>
-              <a:rPr lang="fr-FR" dirty="0" err="1" smtClean="0"/>
-              <a:t>ChargePoint</a:t>
-            </a:r>
-            <a:r>
-              <a:rPr lang="fr-FR" dirty="0" smtClean="0"/>
-              <a:t>, </a:t>
-            </a:r>
-            <a:r>
-              <a:rPr lang="fr-FR" dirty="0" err="1" smtClean="0"/>
-              <a:t>CHAdeMO</a:t>
-            </a:r>
-            <a:r>
-              <a:rPr lang="fr-FR" dirty="0" smtClean="0"/>
-              <a:t>) </a:t>
-            </a:r>
-            <a:r>
-              <a:rPr lang="fr-FR" dirty="0" err="1" smtClean="0"/>
-              <a:t>intrinsecaly</a:t>
-            </a:r>
-            <a:r>
-              <a:rPr lang="fr-FR" dirty="0" smtClean="0"/>
+              <a:rPr lang="en-US" sz="2400" dirty="0"/>
+              <a:t>International </a:t>
+            </a:r>
+            <a:r>
+              <a:rPr lang="en-US" sz="2400" dirty="0" err="1"/>
+              <a:t>Electrotechnical</a:t>
+            </a:r>
+            <a:r>
+              <a:rPr lang="en-US" sz="2400" dirty="0"/>
               <a:t> </a:t>
             </a:r>
             <a:r>
-              <a:rPr lang="fr-FR" dirty="0" err="1" smtClean="0"/>
-              <a:t>create</a:t>
-            </a:r>
-            <a:r>
-              <a:rPr lang="fr-FR" dirty="0" smtClean="0"/>
+              <a:rPr lang="en-US" sz="2400" dirty="0" smtClean="0"/>
+              <a:t>Commission, European </a:t>
+            </a:r>
+            <a:r>
+              <a:rPr lang="en-US" sz="2400" dirty="0"/>
+              <a:t>Environment </a:t>
+            </a:r>
+            <a:r>
+              <a:rPr lang="en-US" sz="2400" dirty="0" err="1"/>
+              <a:t>Grenelle</a:t>
+            </a:r>
+            <a:r>
+              <a:rPr lang="en-US" sz="2400" dirty="0"/>
               <a:t> </a:t>
             </a:r>
             <a:r>
-              <a:rPr lang="fr-FR" dirty="0" err="1" smtClean="0"/>
-              <a:t>rules</a:t>
-            </a:r>
-            <a:r>
-              <a:rPr lang="fr-FR" dirty="0" smtClean="0"/>
-              <a:t> and standards </a:t>
-            </a:r>
-            <a:r>
-              <a:rPr lang="fr-FR" dirty="0" err="1" smtClean="0"/>
-              <a:t>with</a:t>
-            </a:r>
-            <a:r>
-              <a:rPr lang="fr-FR" dirty="0" smtClean="0"/>
-              <a:t> </a:t>
-            </a:r>
-            <a:r>
-              <a:rPr lang="fr-FR" dirty="0" err="1" smtClean="0"/>
-              <a:t>their</a:t>
-            </a:r>
-            <a:r>
-              <a:rPr lang="fr-FR" dirty="0" smtClean="0"/>
-              <a:t> </a:t>
-            </a:r>
-            <a:r>
-              <a:rPr lang="fr-FR" dirty="0" err="1" smtClean="0"/>
-              <a:t>products</a:t>
-            </a:r>
-            <a:endParaRPr lang="fr-FR" dirty="0"/>
-          </a:p>
-          <a:p>
-            <a:pPr marL="0" indent="0">
+              <a:rPr lang="en-US" sz="2400" dirty="0" smtClean="0"/>
+              <a:t>…)</a:t>
+            </a:r>
+          </a:p>
+          <a:p>
+            <a:pPr marL="0" lvl="0" indent="0">
               <a:buNone/>
             </a:pPr>
             <a:r>
-              <a:rPr lang="fr-FR" dirty="0" err="1" smtClean="0"/>
+              <a:rPr lang="en-US" sz="2400" dirty="0" smtClean="0">
+                <a:sym typeface="Wingdings" panose="05000000000000000000" pitchFamily="2" charset="2"/>
+              </a:rPr>
+              <a:t></a:t>
+            </a:r>
+            <a:r>
+              <a:rPr lang="en-US" sz="2400" dirty="0" err="1" smtClean="0">
+                <a:sym typeface="Wingdings" panose="05000000000000000000" pitchFamily="2" charset="2"/>
+              </a:rPr>
               <a:t>E.g</a:t>
             </a:r>
             <a:r>
-              <a:rPr lang="fr-FR" dirty="0" smtClean="0"/>
-              <a:t>. Plug in system, standardisation of the </a:t>
-            </a:r>
-            <a:r>
-              <a:rPr lang="fr-FR" dirty="0" err="1" smtClean="0"/>
-              <a:t>models</a:t>
-            </a:r>
-            <a:endParaRPr lang="fr-FR" dirty="0" smtClean="0"/>
-          </a:p>
-          <a:p>
-            <a:pPr marL="0" indent="0">
+              <a:rPr lang="en-US" sz="2400" dirty="0" smtClean="0">
+                <a:sym typeface="Wingdings" panose="05000000000000000000" pitchFamily="2" charset="2"/>
+              </a:rPr>
+              <a:t> Creation of a section “EV charging stations” in the National Electronic Code (NEC, US)</a:t>
+            </a:r>
+            <a:endParaRPr lang="fr-FR" sz="2400" dirty="0"/>
+          </a:p>
+          <a:p>
+            <a:pPr marL="0" lvl="0" indent="0">
               <a:buNone/>
             </a:pPr>
-            <a:endParaRPr lang="fr-FR" dirty="0"/>
-          </a:p>
-          <a:p>
-            <a:pPr marL="0" indent="0">
-              <a:buNone/>
-            </a:pPr>
-            <a:r>
-              <a:rPr lang="fr-FR" dirty="0" smtClean="0"/>
-              <a:t>Adaptations:</a:t>
-            </a:r>
-          </a:p>
-          <a:p>
-            <a:pPr marL="0" lvl="0" indent="0">
-              <a:buNone/>
-            </a:pPr>
-            <a:r>
-              <a:rPr lang="fr-FR" dirty="0" err="1" smtClean="0"/>
-              <a:t>Governments</a:t>
-            </a:r>
-            <a:r>
-              <a:rPr lang="fr-FR" dirty="0" smtClean="0"/>
-              <a:t> and </a:t>
-            </a:r>
-            <a:r>
-              <a:rPr lang="fr-FR" dirty="0" err="1" smtClean="0"/>
-              <a:t>organizations</a:t>
-            </a:r>
-            <a:r>
-              <a:rPr lang="fr-FR" dirty="0" smtClean="0"/>
-              <a:t> (</a:t>
-            </a:r>
-            <a:r>
-              <a:rPr lang="en-US" dirty="0"/>
-              <a:t>International </a:t>
-            </a:r>
-            <a:r>
-              <a:rPr lang="en-US" dirty="0" err="1"/>
-              <a:t>Electrotechnical</a:t>
-            </a:r>
-            <a:r>
-              <a:rPr lang="en-US" dirty="0"/>
-              <a:t> </a:t>
-            </a:r>
-            <a:r>
-              <a:rPr lang="en-US" dirty="0" smtClean="0"/>
-              <a:t>Commission, European </a:t>
-            </a:r>
-            <a:r>
-              <a:rPr lang="en-US" dirty="0"/>
-              <a:t>Environment </a:t>
-            </a:r>
-            <a:r>
-              <a:rPr lang="en-US" dirty="0" err="1"/>
-              <a:t>Grenelle</a:t>
-            </a:r>
-            <a:r>
-              <a:rPr lang="en-US" dirty="0"/>
-              <a:t> in the </a:t>
-            </a:r>
-            <a:r>
-              <a:rPr lang="en-US" dirty="0" smtClean="0"/>
-              <a:t>EU, …) try to adapt the already existing set of rules to the new technology.</a:t>
-            </a:r>
-            <a:endParaRPr lang="fr-FR" dirty="0"/>
-          </a:p>
-          <a:p>
-            <a:pPr marL="0" indent="0">
-              <a:buNone/>
-            </a:pPr>
-            <a:endParaRPr lang="fr-FR" dirty="0" smtClean="0"/>
+            <a:r>
+              <a:rPr lang="en-US" sz="2400" b="1" u="sng" dirty="0" smtClean="0"/>
+              <a:t>Overview: </a:t>
+            </a:r>
+            <a:r>
+              <a:rPr lang="en-US" sz="2400" dirty="0" smtClean="0"/>
+              <a:t>Rating </a:t>
+            </a:r>
+            <a:r>
+              <a:rPr lang="en-US" sz="2400" dirty="0"/>
+              <a:t>of the supply </a:t>
+            </a:r>
+            <a:r>
+              <a:rPr lang="en-US" sz="2400" dirty="0" smtClean="0"/>
+              <a:t>voltage, </a:t>
+            </a:r>
+            <a:r>
+              <a:rPr lang="en-US" sz="2400" dirty="0"/>
+              <a:t>Safety </a:t>
+            </a:r>
+            <a:r>
+              <a:rPr lang="en-US" sz="2400" dirty="0" smtClean="0"/>
+              <a:t>standards, </a:t>
+            </a:r>
+            <a:r>
+              <a:rPr lang="en-US" sz="2400" dirty="0"/>
+              <a:t>Framework (Agents, </a:t>
+            </a:r>
+            <a:r>
+              <a:rPr lang="en-US" sz="2400" dirty="0" smtClean="0"/>
+              <a:t>Grids, </a:t>
+            </a:r>
+            <a:r>
+              <a:rPr lang="en-US" sz="2400" dirty="0"/>
+              <a:t>metering, communication and control, </a:t>
+            </a:r>
+            <a:r>
+              <a:rPr lang="en-US" sz="2400" dirty="0" smtClean="0"/>
+              <a:t> …)</a:t>
+            </a:r>
+            <a:endParaRPr lang="en-US" sz="2400" dirty="0" smtClean="0"/>
           </a:p>
         </p:txBody>
       </p:sp>
@@ -4207,7 +4250,7 @@
   <a:extraClrSchemeLst/>
   <a:extLst>
     <a:ext uri="{05A4C25C-085E-4340-85A3-A5531E510DB2}">
-      <thm15:themeFamily xmlns:thm15="http://schemas.microsoft.com/office/thememl/2012/main" name="Office Theme" id="{62F939B6-93AF-4DB8-9C6B-D6C7DFDC589F}" vid="{4A3C46E8-61CC-4603-A589-7422A47A8E4A}"/>
+      <thm15:themeFamily xmlns:thm15="http://schemas.microsoft.com/office/thememl/2012/main" xmlns="" name="Office Theme" id="{62F939B6-93AF-4DB8-9C6B-D6C7DFDC589F}" vid="{4A3C46E8-61CC-4603-A589-7422A47A8E4A}"/>
     </a:ext>
   </a:extLst>
 </a:theme>

</xml_diff>